<commit_message>
adding sentence about spotify's copyright
just to make sure everyone who logs into this github understand it is just for educational purposes
</commit_message>
<xml_diff>
--- a/Ortal/word2vec slide.pptx
+++ b/Ortal/word2vec slide.pptx
@@ -200,7 +200,7 @@
           <a:p>
             <a:fld id="{CCA39B7F-577E-4953-82A9-F9D484F02F7D}" type="datetimeFigureOut">
               <a:rPr lang="he-IL" smtClean="0"/>
-              <a:t>כ"ג/טבת/תשפ"ה</a:t>
+              <a:t>כ"ד/טבת/תשפ"ה</a:t>
             </a:fld>
             <a:endParaRPr lang="he-IL"/>
           </a:p>
@@ -828,7 +828,7 @@
           <a:p>
             <a:fld id="{A0D2388C-ECDA-4972-A72B-60BD93EA7385}" type="datetimeFigureOut">
               <a:rPr lang="he-IL" smtClean="0"/>
-              <a:t>כ"ג/טבת/תשפ"ה</a:t>
+              <a:t>כ"ד/טבת/תשפ"ה</a:t>
             </a:fld>
             <a:endParaRPr lang="he-IL"/>
           </a:p>
@@ -1166,7 +1166,7 @@
           <a:p>
             <a:fld id="{A0D2388C-ECDA-4972-A72B-60BD93EA7385}" type="datetimeFigureOut">
               <a:rPr lang="he-IL" smtClean="0"/>
-              <a:t>כ"ג/טבת/תשפ"ה</a:t>
+              <a:t>כ"ד/טבת/תשפ"ה</a:t>
             </a:fld>
             <a:endParaRPr lang="he-IL"/>
           </a:p>
@@ -1567,7 +1567,7 @@
           <a:p>
             <a:fld id="{A0D2388C-ECDA-4972-A72B-60BD93EA7385}" type="datetimeFigureOut">
               <a:rPr lang="he-IL" smtClean="0"/>
-              <a:t>כ"ג/טבת/תשפ"ה</a:t>
+              <a:t>כ"ד/טבת/תשפ"ה</a:t>
             </a:fld>
             <a:endParaRPr lang="he-IL"/>
           </a:p>
@@ -1903,7 +1903,7 @@
           <a:p>
             <a:fld id="{A0D2388C-ECDA-4972-A72B-60BD93EA7385}" type="datetimeFigureOut">
               <a:rPr lang="he-IL" smtClean="0"/>
-              <a:t>כ"ג/טבת/תשפ"ה</a:t>
+              <a:t>כ"ד/טבת/תשפ"ה</a:t>
             </a:fld>
             <a:endParaRPr lang="he-IL"/>
           </a:p>
@@ -2223,7 +2223,7 @@
           <a:p>
             <a:fld id="{A0D2388C-ECDA-4972-A72B-60BD93EA7385}" type="datetimeFigureOut">
               <a:rPr lang="he-IL" smtClean="0"/>
-              <a:t>כ"ג/טבת/תשפ"ה</a:t>
+              <a:t>כ"ד/טבת/תשפ"ה</a:t>
             </a:fld>
             <a:endParaRPr lang="he-IL"/>
           </a:p>
@@ -2619,7 +2619,7 @@
           <a:p>
             <a:fld id="{A0D2388C-ECDA-4972-A72B-60BD93EA7385}" type="datetimeFigureOut">
               <a:rPr lang="he-IL" smtClean="0"/>
-              <a:t>כ"ג/טבת/תשפ"ה</a:t>
+              <a:t>כ"ד/טבת/תשפ"ה</a:t>
             </a:fld>
             <a:endParaRPr lang="he-IL"/>
           </a:p>
@@ -2876,7 +2876,7 @@
           <a:p>
             <a:fld id="{A0D2388C-ECDA-4972-A72B-60BD93EA7385}" type="datetimeFigureOut">
               <a:rPr lang="he-IL" smtClean="0"/>
-              <a:t>כ"ג/טבת/תשפ"ה</a:t>
+              <a:t>כ"ד/טבת/תשפ"ה</a:t>
             </a:fld>
             <a:endParaRPr lang="he-IL"/>
           </a:p>
@@ -3138,7 +3138,7 @@
           <a:p>
             <a:fld id="{A0D2388C-ECDA-4972-A72B-60BD93EA7385}" type="datetimeFigureOut">
               <a:rPr lang="he-IL" smtClean="0"/>
-              <a:t>כ"ג/טבת/תשפ"ה</a:t>
+              <a:t>כ"ד/טבת/תשפ"ה</a:t>
             </a:fld>
             <a:endParaRPr lang="he-IL"/>
           </a:p>
@@ -3400,7 +3400,7 @@
           <a:p>
             <a:fld id="{A0D2388C-ECDA-4972-A72B-60BD93EA7385}" type="datetimeFigureOut">
               <a:rPr lang="he-IL" smtClean="0"/>
-              <a:t>כ"ג/טבת/תשפ"ה</a:t>
+              <a:t>כ"ד/טבת/תשפ"ה</a:t>
             </a:fld>
             <a:endParaRPr lang="he-IL"/>
           </a:p>
@@ -3729,7 +3729,7 @@
           <a:p>
             <a:fld id="{A0D2388C-ECDA-4972-A72B-60BD93EA7385}" type="datetimeFigureOut">
               <a:rPr lang="he-IL" smtClean="0"/>
-              <a:t>כ"ג/טבת/תשפ"ה</a:t>
+              <a:t>כ"ד/טבת/תשפ"ה</a:t>
             </a:fld>
             <a:endParaRPr lang="he-IL"/>
           </a:p>
@@ -4052,7 +4052,7 @@
           <a:p>
             <a:fld id="{A0D2388C-ECDA-4972-A72B-60BD93EA7385}" type="datetimeFigureOut">
               <a:rPr lang="he-IL" smtClean="0"/>
-              <a:t>כ"ג/טבת/תשפ"ה</a:t>
+              <a:t>כ"ד/טבת/תשפ"ה</a:t>
             </a:fld>
             <a:endParaRPr lang="he-IL"/>
           </a:p>
@@ -4509,7 +4509,7 @@
           <a:p>
             <a:fld id="{A0D2388C-ECDA-4972-A72B-60BD93EA7385}" type="datetimeFigureOut">
               <a:rPr lang="he-IL" smtClean="0"/>
-              <a:t>כ"ג/טבת/תשפ"ה</a:t>
+              <a:t>כ"ד/טבת/תשפ"ה</a:t>
             </a:fld>
             <a:endParaRPr lang="he-IL"/>
           </a:p>
@@ -4714,7 +4714,7 @@
           <a:p>
             <a:fld id="{A0D2388C-ECDA-4972-A72B-60BD93EA7385}" type="datetimeFigureOut">
               <a:rPr lang="he-IL" smtClean="0"/>
-              <a:t>כ"ג/טבת/תשפ"ה</a:t>
+              <a:t>כ"ד/טבת/תשפ"ה</a:t>
             </a:fld>
             <a:endParaRPr lang="he-IL"/>
           </a:p>
@@ -4891,7 +4891,7 @@
           <a:p>
             <a:fld id="{A0D2388C-ECDA-4972-A72B-60BD93EA7385}" type="datetimeFigureOut">
               <a:rPr lang="he-IL" smtClean="0"/>
-              <a:t>כ"ג/טבת/תשפ"ה</a:t>
+              <a:t>כ"ד/טבת/תשפ"ה</a:t>
             </a:fld>
             <a:endParaRPr lang="he-IL"/>
           </a:p>
@@ -5224,7 +5224,7 @@
           <a:p>
             <a:fld id="{A0D2388C-ECDA-4972-A72B-60BD93EA7385}" type="datetimeFigureOut">
               <a:rPr lang="he-IL" smtClean="0"/>
-              <a:t>כ"ג/טבת/תשפ"ה</a:t>
+              <a:t>כ"ד/טבת/תשפ"ה</a:t>
             </a:fld>
             <a:endParaRPr lang="he-IL"/>
           </a:p>
@@ -5569,7 +5569,7 @@
           <a:p>
             <a:fld id="{A0D2388C-ECDA-4972-A72B-60BD93EA7385}" type="datetimeFigureOut">
               <a:rPr lang="he-IL" smtClean="0"/>
-              <a:t>כ"ג/טבת/תשפ"ה</a:t>
+              <a:t>כ"ד/טבת/תשפ"ה</a:t>
             </a:fld>
             <a:endParaRPr lang="he-IL"/>
           </a:p>
@@ -7686,7 +7686,7 @@
           <a:p>
             <a:fld id="{A0D2388C-ECDA-4972-A72B-60BD93EA7385}" type="datetimeFigureOut">
               <a:rPr lang="he-IL" smtClean="0"/>
-              <a:t>כ"ג/טבת/תשפ"ה</a:t>
+              <a:t>כ"ד/טבת/תשפ"ה</a:t>
             </a:fld>
             <a:endParaRPr lang="he-IL"/>
           </a:p>
@@ -9221,6 +9221,59 @@
           </a:effectLst>
         </p:spPr>
       </p:pic>
+      <p:sp>
+        <p:nvSpPr>
+          <p:cNvPr id="3" name="תיבת טקסט 2">
+            <a:extLst>
+              <a:ext uri="{FF2B5EF4-FFF2-40B4-BE49-F238E27FC236}">
+                <a16:creationId xmlns:a16="http://schemas.microsoft.com/office/drawing/2014/main" id="{F5097D03-5BE0-27B6-2EA0-E0157E6F2D30}"/>
+              </a:ext>
+            </a:extLst>
+          </p:cNvPr>
+          <p:cNvSpPr txBox="1"/>
+          <p:nvPr/>
+        </p:nvSpPr>
+        <p:spPr>
+          <a:xfrm>
+            <a:off x="10126239" y="5977730"/>
+            <a:ext cx="2126697" cy="769441"/>
+          </a:xfrm>
+          <a:prstGeom prst="rect">
+            <a:avLst/>
+          </a:prstGeom>
+          <a:noFill/>
+        </p:spPr>
+        <p:txBody>
+          <a:bodyPr wrap="square">
+            <a:spAutoFit/>
+          </a:bodyPr>
+          <a:lstStyle/>
+          <a:p>
+            <a:pPr algn="ctr"/>
+            <a:r>
+              <a:rPr lang="en-US" sz="1100" dirty="0">
+                <a:effectLst>
+                  <a:outerShdw blurRad="38100" dist="38100" dir="2700000" algn="tl">
+                    <a:srgbClr val="000000">
+                      <a:alpha val="43137"/>
+                    </a:srgbClr>
+                  </a:outerShdw>
+                </a:effectLst>
+              </a:rPr>
+              <a:t>** Spotify logo and data are copyrighted by Spotify and used for educational purposes only.</a:t>
+            </a:r>
+            <a:endParaRPr lang="he-IL" sz="1100" dirty="0">
+              <a:effectLst>
+                <a:outerShdw blurRad="38100" dist="38100" dir="2700000" algn="tl">
+                  <a:srgbClr val="000000">
+                    <a:alpha val="43137"/>
+                  </a:srgbClr>
+                </a:outerShdw>
+              </a:effectLst>
+            </a:endParaRPr>
+          </a:p>
+        </p:txBody>
+      </p:sp>
     </p:spTree>
     <p:extLst>
       <p:ext uri="{BB962C8B-B14F-4D97-AF65-F5344CB8AC3E}">

</xml_diff>